<commit_message>
Documentation - sources slide
</commit_message>
<xml_diff>
--- a/Notes/Documentation.pptx
+++ b/Notes/Documentation.pptx
@@ -7,6 +7,7 @@
   <p:sldIdLst>
     <p:sldId id="256" r:id="rId2"/>
     <p:sldId id="257" r:id="rId3"/>
+    <p:sldId id="258" r:id="rId4"/>
   </p:sldIdLst>
   <p:sldSz cx="12192000" cy="6858000"/>
   <p:notesSz cx="6858000" cy="9144000"/>
@@ -105,6 +106,11 @@
       </a:defRPr>
     </a:lvl9pPr>
   </p:defaultTextStyle>
+  <p:extLst>
+    <p:ext uri="{EFAFB233-063F-42B5-8137-9DF3F51BA10A}">
+      <p15:sldGuideLst xmlns:p15="http://schemas.microsoft.com/office/powerpoint/2012/main"/>
+    </p:ext>
+  </p:extLst>
 </p:presentation>
 </file>
 
@@ -121,7 +127,7 @@
   <pc:docChgLst>
     <pc:chgData name="Miguel Cruz" userId="30e37026378c72a3" providerId="LiveId" clId="{C017BC73-7D3A-4270-B546-D6B56131CBAF}"/>
     <pc:docChg chg="custSel addSld modSld">
-      <pc:chgData name="Miguel Cruz" userId="30e37026378c72a3" providerId="LiveId" clId="{C017BC73-7D3A-4270-B546-D6B56131CBAF}" dt="2025-05-10T22:37:56.654" v="51" actId="1076"/>
+      <pc:chgData name="Miguel Cruz" userId="30e37026378c72a3" providerId="LiveId" clId="{C017BC73-7D3A-4270-B546-D6B56131CBAF}" dt="2025-05-16T02:52:17.600" v="91" actId="20577"/>
       <pc:docMkLst>
         <pc:docMk/>
       </pc:docMkLst>
@@ -146,22 +152,6 @@
           <pc:docMk/>
           <pc:sldMk cId="1507793492" sldId="257"/>
         </pc:sldMkLst>
-        <pc:spChg chg="del">
-          <ac:chgData name="Miguel Cruz" userId="30e37026378c72a3" providerId="LiveId" clId="{C017BC73-7D3A-4270-B546-D6B56131CBAF}" dt="2025-05-10T22:36:44.767" v="2" actId="478"/>
-          <ac:spMkLst>
-            <pc:docMk/>
-            <pc:sldMk cId="1507793492" sldId="257"/>
-            <ac:spMk id="2" creationId="{9FA1B126-2587-D971-0FE3-393D511A77B6}"/>
-          </ac:spMkLst>
-        </pc:spChg>
-        <pc:spChg chg="del">
-          <ac:chgData name="Miguel Cruz" userId="30e37026378c72a3" providerId="LiveId" clId="{C017BC73-7D3A-4270-B546-D6B56131CBAF}" dt="2025-05-10T22:36:42.833" v="1" actId="478"/>
-          <ac:spMkLst>
-            <pc:docMk/>
-            <pc:sldMk cId="1507793492" sldId="257"/>
-            <ac:spMk id="3" creationId="{D18F19FB-C2CF-B9C8-83D6-26D275ABD345}"/>
-          </ac:spMkLst>
-        </pc:spChg>
         <pc:spChg chg="add mod">
           <ac:chgData name="Miguel Cruz" userId="30e37026378c72a3" providerId="LiveId" clId="{C017BC73-7D3A-4270-B546-D6B56131CBAF}" dt="2025-05-10T22:37:46.999" v="48" actId="255"/>
           <ac:spMkLst>
@@ -178,6 +168,29 @@
             <ac:picMk id="5" creationId="{C5FCD175-A828-8941-D971-D1A6B1D885C8}"/>
           </ac:picMkLst>
         </pc:picChg>
+      </pc:sldChg>
+      <pc:sldChg chg="modSp new mod">
+        <pc:chgData name="Miguel Cruz" userId="30e37026378c72a3" providerId="LiveId" clId="{C017BC73-7D3A-4270-B546-D6B56131CBAF}" dt="2025-05-16T02:52:17.600" v="91" actId="20577"/>
+        <pc:sldMkLst>
+          <pc:docMk/>
+          <pc:sldMk cId="1721070813" sldId="258"/>
+        </pc:sldMkLst>
+        <pc:spChg chg="mod">
+          <ac:chgData name="Miguel Cruz" userId="30e37026378c72a3" providerId="LiveId" clId="{C017BC73-7D3A-4270-B546-D6B56131CBAF}" dt="2025-05-16T02:52:02.867" v="59" actId="20577"/>
+          <ac:spMkLst>
+            <pc:docMk/>
+            <pc:sldMk cId="1721070813" sldId="258"/>
+            <ac:spMk id="2" creationId="{BD268453-7EE1-FC38-EC0F-53F123FEFE15}"/>
+          </ac:spMkLst>
+        </pc:spChg>
+        <pc:spChg chg="mod">
+          <ac:chgData name="Miguel Cruz" userId="30e37026378c72a3" providerId="LiveId" clId="{C017BC73-7D3A-4270-B546-D6B56131CBAF}" dt="2025-05-16T02:52:17.600" v="91" actId="20577"/>
+          <ac:spMkLst>
+            <pc:docMk/>
+            <pc:sldMk cId="1721070813" sldId="258"/>
+            <ac:spMk id="3" creationId="{B9694024-00AE-E4D4-CEAF-58D8AF9CE070}"/>
+          </ac:spMkLst>
+        </pc:spChg>
       </pc:sldChg>
     </pc:docChg>
   </pc:docChgLst>
@@ -331,7 +344,7 @@
           <a:p>
             <a:fld id="{2B7E85D3-977B-4CE2-9923-7839D4251D14}" type="datetimeFigureOut">
               <a:rPr lang="en-US" smtClean="0"/>
-              <a:t>5/10/2025</a:t>
+              <a:t>5/15/2025</a:t>
             </a:fld>
             <a:endParaRPr lang="en-US"/>
           </a:p>
@@ -529,7 +542,7 @@
           <a:p>
             <a:fld id="{2B7E85D3-977B-4CE2-9923-7839D4251D14}" type="datetimeFigureOut">
               <a:rPr lang="en-US" smtClean="0"/>
-              <a:t>5/10/2025</a:t>
+              <a:t>5/15/2025</a:t>
             </a:fld>
             <a:endParaRPr lang="en-US"/>
           </a:p>
@@ -737,7 +750,7 @@
           <a:p>
             <a:fld id="{2B7E85D3-977B-4CE2-9923-7839D4251D14}" type="datetimeFigureOut">
               <a:rPr lang="en-US" smtClean="0"/>
-              <a:t>5/10/2025</a:t>
+              <a:t>5/15/2025</a:t>
             </a:fld>
             <a:endParaRPr lang="en-US"/>
           </a:p>
@@ -935,7 +948,7 @@
           <a:p>
             <a:fld id="{2B7E85D3-977B-4CE2-9923-7839D4251D14}" type="datetimeFigureOut">
               <a:rPr lang="en-US" smtClean="0"/>
-              <a:t>5/10/2025</a:t>
+              <a:t>5/15/2025</a:t>
             </a:fld>
             <a:endParaRPr lang="en-US"/>
           </a:p>
@@ -1210,7 +1223,7 @@
           <a:p>
             <a:fld id="{2B7E85D3-977B-4CE2-9923-7839D4251D14}" type="datetimeFigureOut">
               <a:rPr lang="en-US" smtClean="0"/>
-              <a:t>5/10/2025</a:t>
+              <a:t>5/15/2025</a:t>
             </a:fld>
             <a:endParaRPr lang="en-US"/>
           </a:p>
@@ -1475,7 +1488,7 @@
           <a:p>
             <a:fld id="{2B7E85D3-977B-4CE2-9923-7839D4251D14}" type="datetimeFigureOut">
               <a:rPr lang="en-US" smtClean="0"/>
-              <a:t>5/10/2025</a:t>
+              <a:t>5/15/2025</a:t>
             </a:fld>
             <a:endParaRPr lang="en-US"/>
           </a:p>
@@ -1887,7 +1900,7 @@
           <a:p>
             <a:fld id="{2B7E85D3-977B-4CE2-9923-7839D4251D14}" type="datetimeFigureOut">
               <a:rPr lang="en-US" smtClean="0"/>
-              <a:t>5/10/2025</a:t>
+              <a:t>5/15/2025</a:t>
             </a:fld>
             <a:endParaRPr lang="en-US"/>
           </a:p>
@@ -2028,7 +2041,7 @@
           <a:p>
             <a:fld id="{2B7E85D3-977B-4CE2-9923-7839D4251D14}" type="datetimeFigureOut">
               <a:rPr lang="en-US" smtClean="0"/>
-              <a:t>5/10/2025</a:t>
+              <a:t>5/15/2025</a:t>
             </a:fld>
             <a:endParaRPr lang="en-US"/>
           </a:p>
@@ -2141,7 +2154,7 @@
           <a:p>
             <a:fld id="{2B7E85D3-977B-4CE2-9923-7839D4251D14}" type="datetimeFigureOut">
               <a:rPr lang="en-US" smtClean="0"/>
-              <a:t>5/10/2025</a:t>
+              <a:t>5/15/2025</a:t>
             </a:fld>
             <a:endParaRPr lang="en-US"/>
           </a:p>
@@ -2452,7 +2465,7 @@
           <a:p>
             <a:fld id="{2B7E85D3-977B-4CE2-9923-7839D4251D14}" type="datetimeFigureOut">
               <a:rPr lang="en-US" smtClean="0"/>
-              <a:t>5/10/2025</a:t>
+              <a:t>5/15/2025</a:t>
             </a:fld>
             <a:endParaRPr lang="en-US"/>
           </a:p>
@@ -2740,7 +2753,7 @@
           <a:p>
             <a:fld id="{2B7E85D3-977B-4CE2-9923-7839D4251D14}" type="datetimeFigureOut">
               <a:rPr lang="en-US" smtClean="0"/>
-              <a:t>5/10/2025</a:t>
+              <a:t>5/15/2025</a:t>
             </a:fld>
             <a:endParaRPr lang="en-US"/>
           </a:p>
@@ -2981,7 +2994,7 @@
           <a:p>
             <a:fld id="{2B7E85D3-977B-4CE2-9923-7839D4251D14}" type="datetimeFigureOut">
               <a:rPr lang="en-US" smtClean="0"/>
-              <a:t>5/10/2025</a:t>
+              <a:t>5/15/2025</a:t>
             </a:fld>
             <a:endParaRPr lang="en-US"/>
           </a:p>
@@ -3571,6 +3584,104 @@
 </p:sld>
 </file>
 
+<file path=ppt/slides/slide3.xml><?xml version="1.0" encoding="utf-8"?>
+<p:sld xmlns:a="http://schemas.openxmlformats.org/drawingml/2006/main" xmlns:r="http://schemas.openxmlformats.org/officeDocument/2006/relationships" xmlns:p="http://schemas.openxmlformats.org/presentationml/2006/main">
+  <p:cSld>
+    <p:spTree>
+      <p:nvGrpSpPr>
+        <p:cNvPr id="1" name=""/>
+        <p:cNvGrpSpPr/>
+        <p:nvPr/>
+      </p:nvGrpSpPr>
+      <p:grpSpPr>
+        <a:xfrm>
+          <a:off x="0" y="0"/>
+          <a:ext cx="0" cy="0"/>
+          <a:chOff x="0" y="0"/>
+          <a:chExt cx="0" cy="0"/>
+        </a:xfrm>
+      </p:grpSpPr>
+      <p:sp>
+        <p:nvSpPr>
+          <p:cNvPr id="2" name="Title 1">
+            <a:extLst>
+              <a:ext uri="{FF2B5EF4-FFF2-40B4-BE49-F238E27FC236}">
+                <a16:creationId xmlns:a16="http://schemas.microsoft.com/office/drawing/2014/main" id="{BD268453-7EE1-FC38-EC0F-53F123FEFE15}"/>
+              </a:ext>
+            </a:extLst>
+          </p:cNvPr>
+          <p:cNvSpPr>
+            <a:spLocks noGrp="1"/>
+          </p:cNvSpPr>
+          <p:nvPr>
+            <p:ph type="title"/>
+          </p:nvPr>
+        </p:nvSpPr>
+        <p:spPr/>
+        <p:txBody>
+          <a:bodyPr/>
+          <a:lstStyle/>
+          <a:p>
+            <a:r>
+              <a:rPr lang="en-US" dirty="0"/>
+              <a:t>Sources</a:t>
+            </a:r>
+          </a:p>
+        </p:txBody>
+      </p:sp>
+      <p:sp>
+        <p:nvSpPr>
+          <p:cNvPr id="3" name="Content Placeholder 2">
+            <a:extLst>
+              <a:ext uri="{FF2B5EF4-FFF2-40B4-BE49-F238E27FC236}">
+                <a16:creationId xmlns:a16="http://schemas.microsoft.com/office/drawing/2014/main" id="{B9694024-00AE-E4D4-CEAF-58D8AF9CE070}"/>
+              </a:ext>
+            </a:extLst>
+          </p:cNvPr>
+          <p:cNvSpPr>
+            <a:spLocks noGrp="1"/>
+          </p:cNvSpPr>
+          <p:nvPr>
+            <p:ph idx="1"/>
+          </p:nvPr>
+        </p:nvSpPr>
+        <p:spPr/>
+        <p:txBody>
+          <a:bodyPr/>
+          <a:lstStyle/>
+          <a:p>
+            <a:r>
+              <a:rPr lang="en-US" dirty="0"/>
+              <a:t>Open SF</a:t>
+            </a:r>
+          </a:p>
+          <a:p>
+            <a:r>
+              <a:rPr lang="en-US" dirty="0"/>
+              <a:t>Census.gov</a:t>
+            </a:r>
+          </a:p>
+          <a:p>
+            <a:r>
+              <a:rPr lang="en-US"/>
+              <a:t>Weather API</a:t>
+            </a:r>
+          </a:p>
+        </p:txBody>
+      </p:sp>
+    </p:spTree>
+    <p:extLst>
+      <p:ext uri="{BB962C8B-B14F-4D97-AF65-F5344CB8AC3E}">
+        <p14:creationId xmlns:p14="http://schemas.microsoft.com/office/powerpoint/2010/main" val="1721070813"/>
+      </p:ext>
+    </p:extLst>
+  </p:cSld>
+  <p:clrMapOvr>
+    <a:masterClrMapping/>
+  </p:clrMapOvr>
+</p:sld>
+</file>
+
 <file path=ppt/theme/theme1.xml><?xml version="1.0" encoding="utf-8"?>
 <a:theme xmlns:a="http://schemas.openxmlformats.org/drawingml/2006/main" name="Office Theme">
   <a:themeElements>

</xml_diff>